<commit_message>
Starting Issue729 [add images to contact.html and terms.html] Update Issue 729 Added images. Also tweaked index.html and about.html
</commit_message>
<xml_diff>
--- a/doc/diagrams/Icons.pptx
+++ b/doc/diagrams/Icons.pptx
@@ -6,9 +6,14 @@
   </p:sldMasterIdLst>
   <p:sldIdLst>
     <p:sldId id="257" r:id="rId2"/>
+    <p:sldId id="258" r:id="rId3"/>
+    <p:sldId id="259" r:id="rId4"/>
   </p:sldIdLst>
   <p:sldSz cx="2743200" cy="2011363"/>
   <p:notesSz cx="6858000" cy="9144000"/>
+  <p:custDataLst>
+    <p:tags r:id="rId5"/>
+  </p:custDataLst>
   <p:defaultTextStyle>
     <a:defPPr>
       <a:defRPr lang="en-US"/>
@@ -289,7 +294,7 @@
             <a:fld id="{1D8BD707-D9CF-40AE-B4C6-C98DA3205C09}" type="datetimeFigureOut">
               <a:rPr lang="en-US" smtClean="0"/>
               <a:pPr/>
-              <a:t>3/15/2013</a:t>
+              <a:t>3/21/2013</a:t>
             </a:fld>
             <a:endParaRPr lang="en-US"/>
           </a:p>
@@ -463,7 +468,7 @@
             <a:fld id="{1D8BD707-D9CF-40AE-B4C6-C98DA3205C09}" type="datetimeFigureOut">
               <a:rPr lang="en-US" smtClean="0"/>
               <a:pPr/>
-              <a:t>3/15/2013</a:t>
+              <a:t>3/21/2013</a:t>
             </a:fld>
             <a:endParaRPr lang="en-US"/>
           </a:p>
@@ -640,7 +645,7 @@
             <a:fld id="{1D8BD707-D9CF-40AE-B4C6-C98DA3205C09}" type="datetimeFigureOut">
               <a:rPr lang="en-US" smtClean="0"/>
               <a:pPr/>
-              <a:t>3/15/2013</a:t>
+              <a:t>3/21/2013</a:t>
             </a:fld>
             <a:endParaRPr lang="en-US"/>
           </a:p>
@@ -807,7 +812,7 @@
             <a:fld id="{1D8BD707-D9CF-40AE-B4C6-C98DA3205C09}" type="datetimeFigureOut">
               <a:rPr lang="en-US" smtClean="0"/>
               <a:pPr/>
-              <a:t>3/15/2013</a:t>
+              <a:t>3/21/2013</a:t>
             </a:fld>
             <a:endParaRPr lang="en-US"/>
           </a:p>
@@ -1050,7 +1055,7 @@
             <a:fld id="{1D8BD707-D9CF-40AE-B4C6-C98DA3205C09}" type="datetimeFigureOut">
               <a:rPr lang="en-US" smtClean="0"/>
               <a:pPr/>
-              <a:t>3/15/2013</a:t>
+              <a:t>3/21/2013</a:t>
             </a:fld>
             <a:endParaRPr lang="en-US"/>
           </a:p>
@@ -1335,7 +1340,7 @@
             <a:fld id="{1D8BD707-D9CF-40AE-B4C6-C98DA3205C09}" type="datetimeFigureOut">
               <a:rPr lang="en-US" smtClean="0"/>
               <a:pPr/>
-              <a:t>3/15/2013</a:t>
+              <a:t>3/21/2013</a:t>
             </a:fld>
             <a:endParaRPr lang="en-US"/>
           </a:p>
@@ -1754,7 +1759,7 @@
             <a:fld id="{1D8BD707-D9CF-40AE-B4C6-C98DA3205C09}" type="datetimeFigureOut">
               <a:rPr lang="en-US" smtClean="0"/>
               <a:pPr/>
-              <a:t>3/15/2013</a:t>
+              <a:t>3/21/2013</a:t>
             </a:fld>
             <a:endParaRPr lang="en-US"/>
           </a:p>
@@ -1869,7 +1874,7 @@
             <a:fld id="{1D8BD707-D9CF-40AE-B4C6-C98DA3205C09}" type="datetimeFigureOut">
               <a:rPr lang="en-US" smtClean="0"/>
               <a:pPr/>
-              <a:t>3/15/2013</a:t>
+              <a:t>3/21/2013</a:t>
             </a:fld>
             <a:endParaRPr lang="en-US"/>
           </a:p>
@@ -1961,7 +1966,7 @@
             <a:fld id="{1D8BD707-D9CF-40AE-B4C6-C98DA3205C09}" type="datetimeFigureOut">
               <a:rPr lang="en-US" smtClean="0"/>
               <a:pPr/>
-              <a:t>3/15/2013</a:t>
+              <a:t>3/21/2013</a:t>
             </a:fld>
             <a:endParaRPr lang="en-US"/>
           </a:p>
@@ -2235,7 +2240,7 @@
             <a:fld id="{1D8BD707-D9CF-40AE-B4C6-C98DA3205C09}" type="datetimeFigureOut">
               <a:rPr lang="en-US" smtClean="0"/>
               <a:pPr/>
-              <a:t>3/15/2013</a:t>
+              <a:t>3/21/2013</a:t>
             </a:fld>
             <a:endParaRPr lang="en-US"/>
           </a:p>
@@ -2485,7 +2490,7 @@
             <a:fld id="{1D8BD707-D9CF-40AE-B4C6-C98DA3205C09}" type="datetimeFigureOut">
               <a:rPr lang="en-US" smtClean="0"/>
               <a:pPr/>
-              <a:t>3/15/2013</a:t>
+              <a:t>3/21/2013</a:t>
             </a:fld>
             <a:endParaRPr lang="en-US"/>
           </a:p>
@@ -2695,7 +2700,7 @@
             <a:fld id="{1D8BD707-D9CF-40AE-B4C6-C98DA3205C09}" type="datetimeFigureOut">
               <a:rPr lang="en-US" smtClean="0"/>
               <a:pPr/>
-              <a:t>3/15/2013</a:t>
+              <a:t>3/21/2013</a:t>
             </a:fld>
             <a:endParaRPr lang="en-US"/>
           </a:p>
@@ -3770,6 +3775,1433 @@
 </p:sld>
 </file>
 
+<file path=ppt/slides/slide2.xml><?xml version="1.0" encoding="utf-8"?>
+<p:sld xmlns:a="http://schemas.openxmlformats.org/drawingml/2006/main" xmlns:r="http://schemas.openxmlformats.org/officeDocument/2006/relationships" xmlns:p="http://schemas.openxmlformats.org/presentationml/2006/main">
+  <p:cSld>
+    <p:spTree>
+      <p:nvGrpSpPr>
+        <p:cNvPr id="1" name=""/>
+        <p:cNvGrpSpPr/>
+        <p:nvPr/>
+      </p:nvGrpSpPr>
+      <p:grpSpPr>
+        <a:xfrm>
+          <a:off x="0" y="0"/>
+          <a:ext cx="0" cy="0"/>
+          <a:chOff x="0" y="0"/>
+          <a:chExt cx="0" cy="0"/>
+        </a:xfrm>
+      </p:grpSpPr>
+      <p:grpSp>
+        <p:nvGrpSpPr>
+          <p:cNvPr id="23" name="Group 22"/>
+          <p:cNvGrpSpPr/>
+          <p:nvPr/>
+        </p:nvGrpSpPr>
+        <p:grpSpPr>
+          <a:xfrm>
+            <a:off x="800853" y="465652"/>
+            <a:ext cx="1069404" cy="688776"/>
+            <a:chOff x="710071" y="818142"/>
+            <a:chExt cx="1069404" cy="688776"/>
+          </a:xfrm>
+        </p:grpSpPr>
+        <p:sp>
+          <p:nvSpPr>
+            <p:cNvPr id="34" name="Flowchart: Connector 33"/>
+            <p:cNvSpPr/>
+            <p:nvPr/>
+          </p:nvSpPr>
+          <p:spPr>
+            <a:xfrm>
+              <a:off x="770784" y="818142"/>
+              <a:ext cx="342109" cy="336286"/>
+            </a:xfrm>
+            <a:prstGeom prst="flowChartConnector">
+              <a:avLst/>
+            </a:prstGeom>
+            <a:noFill/>
+            <a:ln w="28575">
+              <a:solidFill>
+                <a:schemeClr val="tx2"/>
+              </a:solidFill>
+            </a:ln>
+          </p:spPr>
+          <p:style>
+            <a:lnRef idx="2">
+              <a:schemeClr val="accent1">
+                <a:shade val="50000"/>
+              </a:schemeClr>
+            </a:lnRef>
+            <a:fillRef idx="1">
+              <a:schemeClr val="accent1"/>
+            </a:fillRef>
+            <a:effectRef idx="0">
+              <a:schemeClr val="accent1"/>
+            </a:effectRef>
+            <a:fontRef idx="minor">
+              <a:schemeClr val="lt1"/>
+            </a:fontRef>
+          </p:style>
+          <p:txBody>
+            <a:bodyPr rtlCol="0" anchor="ctr"/>
+            <a:lstStyle/>
+            <a:p>
+              <a:pPr algn="ctr"/>
+              <a:endParaRPr lang="en-SG"/>
+            </a:p>
+          </p:txBody>
+        </p:sp>
+        <p:sp>
+          <p:nvSpPr>
+            <p:cNvPr id="35" name="Flowchart: Delay 34"/>
+            <p:cNvSpPr/>
+            <p:nvPr/>
+          </p:nvSpPr>
+          <p:spPr>
+            <a:xfrm rot="16200000">
+              <a:off x="745717" y="1148524"/>
+              <a:ext cx="322748" cy="394039"/>
+            </a:xfrm>
+            <a:prstGeom prst="flowChartDelay">
+              <a:avLst/>
+            </a:prstGeom>
+            <a:noFill/>
+            <a:ln w="28575">
+              <a:solidFill>
+                <a:schemeClr val="tx2"/>
+              </a:solidFill>
+            </a:ln>
+          </p:spPr>
+          <p:style>
+            <a:lnRef idx="2">
+              <a:schemeClr val="accent1">
+                <a:shade val="50000"/>
+              </a:schemeClr>
+            </a:lnRef>
+            <a:fillRef idx="1">
+              <a:schemeClr val="accent1"/>
+            </a:fillRef>
+            <a:effectRef idx="0">
+              <a:schemeClr val="accent1"/>
+            </a:effectRef>
+            <a:fontRef idx="minor">
+              <a:schemeClr val="lt1"/>
+            </a:fontRef>
+          </p:style>
+          <p:txBody>
+            <a:bodyPr rtlCol="0" anchor="ctr"/>
+            <a:lstStyle/>
+            <a:p>
+              <a:pPr algn="ctr"/>
+              <a:endParaRPr lang="en-SG"/>
+            </a:p>
+          </p:txBody>
+        </p:sp>
+        <p:sp>
+          <p:nvSpPr>
+            <p:cNvPr id="36" name="Freeform 35"/>
+            <p:cNvSpPr/>
+            <p:nvPr/>
+          </p:nvSpPr>
+          <p:spPr>
+            <a:xfrm>
+              <a:off x="1087760" y="1062268"/>
+              <a:ext cx="77528" cy="29032"/>
+            </a:xfrm>
+            <a:custGeom>
+              <a:avLst/>
+              <a:gdLst>
+                <a:gd name="connsiteX0" fmla="*/ 0 w 50006"/>
+                <a:gd name="connsiteY0" fmla="*/ 0 h 19050"/>
+                <a:gd name="connsiteX1" fmla="*/ 0 w 50006"/>
+                <a:gd name="connsiteY1" fmla="*/ 0 h 19050"/>
+                <a:gd name="connsiteX2" fmla="*/ 21431 w 50006"/>
+                <a:gd name="connsiteY2" fmla="*/ 4762 h 19050"/>
+                <a:gd name="connsiteX3" fmla="*/ 28575 w 50006"/>
+                <a:gd name="connsiteY3" fmla="*/ 9525 h 19050"/>
+                <a:gd name="connsiteX4" fmla="*/ 38100 w 50006"/>
+                <a:gd name="connsiteY4" fmla="*/ 14287 h 19050"/>
+                <a:gd name="connsiteX5" fmla="*/ 50006 w 50006"/>
+                <a:gd name="connsiteY5" fmla="*/ 19050 h 19050"/>
+              </a:gdLst>
+              <a:ahLst/>
+              <a:cxnLst>
+                <a:cxn ang="0">
+                  <a:pos x="connsiteX0" y="connsiteY0"/>
+                </a:cxn>
+                <a:cxn ang="0">
+                  <a:pos x="connsiteX1" y="connsiteY1"/>
+                </a:cxn>
+                <a:cxn ang="0">
+                  <a:pos x="connsiteX2" y="connsiteY2"/>
+                </a:cxn>
+                <a:cxn ang="0">
+                  <a:pos x="connsiteX3" y="connsiteY3"/>
+                </a:cxn>
+                <a:cxn ang="0">
+                  <a:pos x="connsiteX4" y="connsiteY4"/>
+                </a:cxn>
+                <a:cxn ang="0">
+                  <a:pos x="connsiteX5" y="connsiteY5"/>
+                </a:cxn>
+              </a:cxnLst>
+              <a:rect l="l" t="t" r="r" b="b"/>
+              <a:pathLst>
+                <a:path w="50006" h="19050">
+                  <a:moveTo>
+                    <a:pt x="0" y="0"/>
+                  </a:moveTo>
+                  <a:lnTo>
+                    <a:pt x="0" y="0"/>
+                  </a:lnTo>
+                  <a:cubicBezTo>
+                    <a:pt x="7144" y="1587"/>
+                    <a:pt x="14489" y="2448"/>
+                    <a:pt x="21431" y="4762"/>
+                  </a:cubicBezTo>
+                  <a:cubicBezTo>
+                    <a:pt x="24146" y="5667"/>
+                    <a:pt x="26090" y="8105"/>
+                    <a:pt x="28575" y="9525"/>
+                  </a:cubicBezTo>
+                  <a:cubicBezTo>
+                    <a:pt x="31657" y="11286"/>
+                    <a:pt x="34837" y="12889"/>
+                    <a:pt x="38100" y="14287"/>
+                  </a:cubicBezTo>
+                  <a:cubicBezTo>
+                    <a:pt x="58672" y="23103"/>
+                    <a:pt x="34691" y="11391"/>
+                    <a:pt x="50006" y="19050"/>
+                  </a:cubicBezTo>
+                </a:path>
+              </a:pathLst>
+            </a:custGeom>
+            <a:noFill/>
+            <a:ln w="28575">
+              <a:solidFill>
+                <a:schemeClr val="tx2"/>
+              </a:solidFill>
+            </a:ln>
+          </p:spPr>
+          <p:style>
+            <a:lnRef idx="2">
+              <a:schemeClr val="accent1">
+                <a:shade val="50000"/>
+              </a:schemeClr>
+            </a:lnRef>
+            <a:fillRef idx="1">
+              <a:schemeClr val="accent1"/>
+            </a:fillRef>
+            <a:effectRef idx="0">
+              <a:schemeClr val="accent1"/>
+            </a:effectRef>
+            <a:fontRef idx="minor">
+              <a:schemeClr val="lt1"/>
+            </a:fontRef>
+          </p:style>
+          <p:txBody>
+            <a:bodyPr rtlCol="0" anchor="ctr"/>
+            <a:lstStyle/>
+            <a:p>
+              <a:pPr algn="ctr"/>
+              <a:endParaRPr lang="en-SG"/>
+            </a:p>
+          </p:txBody>
+        </p:sp>
+        <p:sp>
+          <p:nvSpPr>
+            <p:cNvPr id="2" name="Freeform 1"/>
+            <p:cNvSpPr/>
+            <p:nvPr/>
+          </p:nvSpPr>
+          <p:spPr>
+            <a:xfrm rot="20784184">
+              <a:off x="963571" y="1018492"/>
+              <a:ext cx="80391" cy="94854"/>
+            </a:xfrm>
+            <a:custGeom>
+              <a:avLst/>
+              <a:gdLst>
+                <a:gd name="connsiteX0" fmla="*/ 80391 w 80391"/>
+                <a:gd name="connsiteY0" fmla="*/ 94854 h 94854"/>
+                <a:gd name="connsiteX1" fmla="*/ 8302 w 80391"/>
+                <a:gd name="connsiteY1" fmla="*/ 60707 h 94854"/>
+                <a:gd name="connsiteX2" fmla="*/ 4507 w 80391"/>
+                <a:gd name="connsiteY2" fmla="*/ 0 h 94854"/>
+              </a:gdLst>
+              <a:ahLst/>
+              <a:cxnLst>
+                <a:cxn ang="0">
+                  <a:pos x="connsiteX0" y="connsiteY0"/>
+                </a:cxn>
+                <a:cxn ang="0">
+                  <a:pos x="connsiteX1" y="connsiteY1"/>
+                </a:cxn>
+                <a:cxn ang="0">
+                  <a:pos x="connsiteX2" y="connsiteY2"/>
+                </a:cxn>
+              </a:cxnLst>
+              <a:rect l="l" t="t" r="r" b="b"/>
+              <a:pathLst>
+                <a:path w="80391" h="94854">
+                  <a:moveTo>
+                    <a:pt x="80391" y="94854"/>
+                  </a:moveTo>
+                  <a:cubicBezTo>
+                    <a:pt x="50670" y="85685"/>
+                    <a:pt x="20949" y="76516"/>
+                    <a:pt x="8302" y="60707"/>
+                  </a:cubicBezTo>
+                  <a:cubicBezTo>
+                    <a:pt x="-4345" y="44898"/>
+                    <a:pt x="81" y="22449"/>
+                    <a:pt x="4507" y="0"/>
+                  </a:cubicBezTo>
+                </a:path>
+              </a:pathLst>
+            </a:custGeom>
+            <a:noFill/>
+            <a:ln w="28575" cap="rnd">
+              <a:solidFill>
+                <a:schemeClr val="tx2"/>
+              </a:solidFill>
+            </a:ln>
+          </p:spPr>
+          <p:style>
+            <a:lnRef idx="2">
+              <a:schemeClr val="accent1">
+                <a:shade val="50000"/>
+              </a:schemeClr>
+            </a:lnRef>
+            <a:fillRef idx="1">
+              <a:schemeClr val="accent1"/>
+            </a:fillRef>
+            <a:effectRef idx="0">
+              <a:schemeClr val="accent1"/>
+            </a:effectRef>
+            <a:fontRef idx="minor">
+              <a:schemeClr val="lt1"/>
+            </a:fontRef>
+          </p:style>
+          <p:txBody>
+            <a:bodyPr rtlCol="0" anchor="ctr"/>
+            <a:lstStyle/>
+            <a:p>
+              <a:pPr algn="ctr"/>
+              <a:endParaRPr lang="en-US"/>
+            </a:p>
+          </p:txBody>
+        </p:sp>
+        <p:sp>
+          <p:nvSpPr>
+            <p:cNvPr id="18" name="Flowchart: Connector 17"/>
+            <p:cNvSpPr/>
+            <p:nvPr/>
+          </p:nvSpPr>
+          <p:spPr>
+            <a:xfrm>
+              <a:off x="953548" y="894930"/>
+              <a:ext cx="70882" cy="69675"/>
+            </a:xfrm>
+            <a:prstGeom prst="flowChartConnector">
+              <a:avLst/>
+            </a:prstGeom>
+            <a:noFill/>
+            <a:ln w="28575">
+              <a:solidFill>
+                <a:schemeClr val="tx2"/>
+              </a:solidFill>
+            </a:ln>
+          </p:spPr>
+          <p:style>
+            <a:lnRef idx="2">
+              <a:schemeClr val="accent1">
+                <a:shade val="50000"/>
+              </a:schemeClr>
+            </a:lnRef>
+            <a:fillRef idx="1">
+              <a:schemeClr val="accent1"/>
+            </a:fillRef>
+            <a:effectRef idx="0">
+              <a:schemeClr val="accent1"/>
+            </a:effectRef>
+            <a:fontRef idx="minor">
+              <a:schemeClr val="lt1"/>
+            </a:fontRef>
+          </p:style>
+          <p:txBody>
+            <a:bodyPr rtlCol="0" anchor="ctr"/>
+            <a:lstStyle/>
+            <a:p>
+              <a:pPr algn="ctr"/>
+              <a:endParaRPr lang="en-SG"/>
+            </a:p>
+          </p:txBody>
+        </p:sp>
+        <p:grpSp>
+          <p:nvGrpSpPr>
+            <p:cNvPr id="22" name="Group 21"/>
+            <p:cNvGrpSpPr/>
+            <p:nvPr/>
+          </p:nvGrpSpPr>
+          <p:grpSpPr>
+            <a:xfrm rot="21055926">
+              <a:off x="1339348" y="1077701"/>
+              <a:ext cx="440127" cy="282384"/>
+              <a:chOff x="1339349" y="1121467"/>
+              <a:chExt cx="440127" cy="282384"/>
+            </a:xfrm>
+          </p:grpSpPr>
+          <p:sp>
+            <p:nvSpPr>
+              <p:cNvPr id="4" name="Rounded Rectangle 3"/>
+              <p:cNvSpPr/>
+              <p:nvPr/>
+            </p:nvSpPr>
+            <p:spPr>
+              <a:xfrm>
+                <a:off x="1339349" y="1121467"/>
+                <a:ext cx="440127" cy="282384"/>
+              </a:xfrm>
+              <a:prstGeom prst="roundRect">
+                <a:avLst>
+                  <a:gd name="adj" fmla="val 0"/>
+                </a:avLst>
+              </a:prstGeom>
+              <a:noFill/>
+              <a:ln w="28575" cap="rnd">
+                <a:solidFill>
+                  <a:schemeClr val="accent6">
+                    <a:lumMod val="75000"/>
+                  </a:schemeClr>
+                </a:solidFill>
+              </a:ln>
+            </p:spPr>
+            <p:style>
+              <a:lnRef idx="2">
+                <a:schemeClr val="accent1">
+                  <a:shade val="50000"/>
+                </a:schemeClr>
+              </a:lnRef>
+              <a:fillRef idx="1">
+                <a:schemeClr val="accent1"/>
+              </a:fillRef>
+              <a:effectRef idx="0">
+                <a:schemeClr val="accent1"/>
+              </a:effectRef>
+              <a:fontRef idx="minor">
+                <a:schemeClr val="lt1"/>
+              </a:fontRef>
+            </p:style>
+            <p:txBody>
+              <a:bodyPr rtlCol="0" anchor="ctr"/>
+              <a:lstStyle/>
+              <a:p>
+                <a:pPr algn="ctr"/>
+                <a:endParaRPr lang="en-US"/>
+              </a:p>
+            </p:txBody>
+          </p:sp>
+          <p:sp>
+            <p:nvSpPr>
+              <p:cNvPr id="7" name="Freeform 6"/>
+              <p:cNvSpPr/>
+              <p:nvPr/>
+            </p:nvSpPr>
+            <p:spPr>
+              <a:xfrm>
+                <a:off x="1345406" y="1126331"/>
+                <a:ext cx="423863" cy="183357"/>
+              </a:xfrm>
+              <a:custGeom>
+                <a:avLst/>
+                <a:gdLst>
+                  <a:gd name="connsiteX0" fmla="*/ 0 w 423863"/>
+                  <a:gd name="connsiteY0" fmla="*/ 7144 h 183357"/>
+                  <a:gd name="connsiteX1" fmla="*/ 204788 w 423863"/>
+                  <a:gd name="connsiteY1" fmla="*/ 183357 h 183357"/>
+                  <a:gd name="connsiteX2" fmla="*/ 423863 w 423863"/>
+                  <a:gd name="connsiteY2" fmla="*/ 0 h 183357"/>
+                </a:gdLst>
+                <a:ahLst/>
+                <a:cxnLst>
+                  <a:cxn ang="0">
+                    <a:pos x="connsiteX0" y="connsiteY0"/>
+                  </a:cxn>
+                  <a:cxn ang="0">
+                    <a:pos x="connsiteX1" y="connsiteY1"/>
+                  </a:cxn>
+                  <a:cxn ang="0">
+                    <a:pos x="connsiteX2" y="connsiteY2"/>
+                  </a:cxn>
+                </a:cxnLst>
+                <a:rect l="l" t="t" r="r" b="b"/>
+                <a:pathLst>
+                  <a:path w="423863" h="183357">
+                    <a:moveTo>
+                      <a:pt x="0" y="7144"/>
+                    </a:moveTo>
+                    <a:lnTo>
+                      <a:pt x="204788" y="183357"/>
+                    </a:lnTo>
+                    <a:lnTo>
+                      <a:pt x="423863" y="0"/>
+                    </a:lnTo>
+                  </a:path>
+                </a:pathLst>
+              </a:custGeom>
+              <a:noFill/>
+              <a:ln w="28575" cap="rnd">
+                <a:solidFill>
+                  <a:schemeClr val="accent6">
+                    <a:lumMod val="75000"/>
+                  </a:schemeClr>
+                </a:solidFill>
+              </a:ln>
+            </p:spPr>
+            <p:style>
+              <a:lnRef idx="2">
+                <a:schemeClr val="accent1">
+                  <a:shade val="50000"/>
+                </a:schemeClr>
+              </a:lnRef>
+              <a:fillRef idx="1">
+                <a:schemeClr val="accent1"/>
+              </a:fillRef>
+              <a:effectRef idx="0">
+                <a:schemeClr val="accent1"/>
+              </a:effectRef>
+              <a:fontRef idx="minor">
+                <a:schemeClr val="lt1"/>
+              </a:fontRef>
+            </p:style>
+            <p:txBody>
+              <a:bodyPr rtlCol="0" anchor="ctr"/>
+              <a:lstStyle/>
+              <a:p>
+                <a:pPr algn="ctr"/>
+                <a:endParaRPr lang="en-US">
+                  <a:solidFill>
+                    <a:schemeClr val="lt1"/>
+                  </a:solidFill>
+                </a:endParaRPr>
+              </a:p>
+            </p:txBody>
+          </p:sp>
+        </p:grpSp>
+        <p:sp>
+          <p:nvSpPr>
+            <p:cNvPr id="20" name="Freeform 19"/>
+            <p:cNvSpPr/>
+            <p:nvPr/>
+          </p:nvSpPr>
+          <p:spPr>
+            <a:xfrm>
+              <a:off x="1087760" y="1244495"/>
+              <a:ext cx="247795" cy="193503"/>
+            </a:xfrm>
+            <a:custGeom>
+              <a:avLst/>
+              <a:gdLst>
+                <a:gd name="connsiteX0" fmla="*/ 0 w 231445"/>
+                <a:gd name="connsiteY0" fmla="*/ 41736 h 193503"/>
+                <a:gd name="connsiteX1" fmla="*/ 125208 w 231445"/>
+                <a:gd name="connsiteY1" fmla="*/ 193503 h 193503"/>
+                <a:gd name="connsiteX2" fmla="*/ 231445 w 231445"/>
+                <a:gd name="connsiteY2" fmla="*/ 0 h 193503"/>
+              </a:gdLst>
+              <a:ahLst/>
+              <a:cxnLst>
+                <a:cxn ang="0">
+                  <a:pos x="connsiteX0" y="connsiteY0"/>
+                </a:cxn>
+                <a:cxn ang="0">
+                  <a:pos x="connsiteX1" y="connsiteY1"/>
+                </a:cxn>
+                <a:cxn ang="0">
+                  <a:pos x="connsiteX2" y="connsiteY2"/>
+                </a:cxn>
+              </a:cxnLst>
+              <a:rect l="l" t="t" r="r" b="b"/>
+              <a:pathLst>
+                <a:path w="231445" h="193503">
+                  <a:moveTo>
+                    <a:pt x="0" y="41736"/>
+                  </a:moveTo>
+                  <a:lnTo>
+                    <a:pt x="125208" y="193503"/>
+                  </a:lnTo>
+                  <a:lnTo>
+                    <a:pt x="231445" y="0"/>
+                  </a:lnTo>
+                </a:path>
+              </a:pathLst>
+            </a:custGeom>
+            <a:noFill/>
+            <a:ln w="28575" cap="rnd">
+              <a:solidFill>
+                <a:schemeClr val="tx2"/>
+              </a:solidFill>
+              <a:tailEnd type="oval"/>
+            </a:ln>
+          </p:spPr>
+          <p:style>
+            <a:lnRef idx="2">
+              <a:schemeClr val="accent1">
+                <a:shade val="50000"/>
+              </a:schemeClr>
+            </a:lnRef>
+            <a:fillRef idx="1">
+              <a:schemeClr val="accent1"/>
+            </a:fillRef>
+            <a:effectRef idx="0">
+              <a:schemeClr val="accent1"/>
+            </a:effectRef>
+            <a:fontRef idx="minor">
+              <a:schemeClr val="lt1"/>
+            </a:fontRef>
+          </p:style>
+          <p:txBody>
+            <a:bodyPr rtlCol="0" anchor="ctr"/>
+            <a:lstStyle/>
+            <a:p>
+              <a:pPr algn="ctr"/>
+              <a:endParaRPr lang="en-US">
+                <a:solidFill>
+                  <a:schemeClr val="lt1"/>
+                </a:solidFill>
+              </a:endParaRPr>
+            </a:p>
+          </p:txBody>
+        </p:sp>
+      </p:grpSp>
+    </p:spTree>
+    <p:extLst>
+      <p:ext uri="{BB962C8B-B14F-4D97-AF65-F5344CB8AC3E}">
+        <p14:creationId xmlns:p14="http://schemas.microsoft.com/office/powerpoint/2010/main" val="3716401697"/>
+      </p:ext>
+    </p:extLst>
+  </p:cSld>
+  <p:clrMapOvr>
+    <a:masterClrMapping/>
+  </p:clrMapOvr>
+  <p:timing>
+    <p:tnLst>
+      <p:par>
+        <p:cTn id="1" dur="indefinite" restart="never" nodeType="tmRoot"/>
+      </p:par>
+    </p:tnLst>
+  </p:timing>
+</p:sld>
+</file>
+
+<file path=ppt/slides/slide3.xml><?xml version="1.0" encoding="utf-8"?>
+<p:sld xmlns:a="http://schemas.openxmlformats.org/drawingml/2006/main" xmlns:r="http://schemas.openxmlformats.org/officeDocument/2006/relationships" xmlns:p="http://schemas.openxmlformats.org/presentationml/2006/main">
+  <p:cSld>
+    <p:spTree>
+      <p:nvGrpSpPr>
+        <p:cNvPr id="1" name=""/>
+        <p:cNvGrpSpPr/>
+        <p:nvPr/>
+      </p:nvGrpSpPr>
+      <p:grpSpPr>
+        <a:xfrm>
+          <a:off x="0" y="0"/>
+          <a:ext cx="0" cy="0"/>
+          <a:chOff x="0" y="0"/>
+          <a:chExt cx="0" cy="0"/>
+        </a:xfrm>
+      </p:grpSpPr>
+      <p:grpSp>
+        <p:nvGrpSpPr>
+          <p:cNvPr id="10" name="Group 9"/>
+          <p:cNvGrpSpPr/>
+          <p:nvPr/>
+        </p:nvGrpSpPr>
+        <p:grpSpPr>
+          <a:xfrm>
+            <a:off x="800853" y="465652"/>
+            <a:ext cx="1039331" cy="688776"/>
+            <a:chOff x="800853" y="465652"/>
+            <a:chExt cx="1039331" cy="688776"/>
+          </a:xfrm>
+        </p:grpSpPr>
+        <p:sp>
+          <p:nvSpPr>
+            <p:cNvPr id="34" name="Flowchart: Connector 33"/>
+            <p:cNvSpPr/>
+            <p:nvPr/>
+          </p:nvSpPr>
+          <p:spPr>
+            <a:xfrm>
+              <a:off x="861566" y="465652"/>
+              <a:ext cx="342109" cy="336286"/>
+            </a:xfrm>
+            <a:prstGeom prst="flowChartConnector">
+              <a:avLst/>
+            </a:prstGeom>
+            <a:noFill/>
+            <a:ln w="28575">
+              <a:solidFill>
+                <a:schemeClr val="tx2"/>
+              </a:solidFill>
+            </a:ln>
+          </p:spPr>
+          <p:style>
+            <a:lnRef idx="2">
+              <a:schemeClr val="accent1">
+                <a:shade val="50000"/>
+              </a:schemeClr>
+            </a:lnRef>
+            <a:fillRef idx="1">
+              <a:schemeClr val="accent1"/>
+            </a:fillRef>
+            <a:effectRef idx="0">
+              <a:schemeClr val="accent1"/>
+            </a:effectRef>
+            <a:fontRef idx="minor">
+              <a:schemeClr val="lt1"/>
+            </a:fontRef>
+          </p:style>
+          <p:txBody>
+            <a:bodyPr rtlCol="0" anchor="ctr"/>
+            <a:lstStyle/>
+            <a:p>
+              <a:pPr algn="ctr"/>
+              <a:endParaRPr lang="en-SG"/>
+            </a:p>
+          </p:txBody>
+        </p:sp>
+        <p:sp>
+          <p:nvSpPr>
+            <p:cNvPr id="35" name="Flowchart: Delay 34"/>
+            <p:cNvSpPr/>
+            <p:nvPr/>
+          </p:nvSpPr>
+          <p:spPr>
+            <a:xfrm rot="16200000">
+              <a:off x="836499" y="796034"/>
+              <a:ext cx="322748" cy="394039"/>
+            </a:xfrm>
+            <a:prstGeom prst="flowChartDelay">
+              <a:avLst/>
+            </a:prstGeom>
+            <a:noFill/>
+            <a:ln w="28575">
+              <a:solidFill>
+                <a:schemeClr val="tx2"/>
+              </a:solidFill>
+            </a:ln>
+          </p:spPr>
+          <p:style>
+            <a:lnRef idx="2">
+              <a:schemeClr val="accent1">
+                <a:shade val="50000"/>
+              </a:schemeClr>
+            </a:lnRef>
+            <a:fillRef idx="1">
+              <a:schemeClr val="accent1"/>
+            </a:fillRef>
+            <a:effectRef idx="0">
+              <a:schemeClr val="accent1"/>
+            </a:effectRef>
+            <a:fontRef idx="minor">
+              <a:schemeClr val="lt1"/>
+            </a:fontRef>
+          </p:style>
+          <p:txBody>
+            <a:bodyPr rtlCol="0" anchor="ctr"/>
+            <a:lstStyle/>
+            <a:p>
+              <a:pPr algn="ctr"/>
+              <a:endParaRPr lang="en-SG"/>
+            </a:p>
+          </p:txBody>
+        </p:sp>
+        <p:sp>
+          <p:nvSpPr>
+            <p:cNvPr id="36" name="Freeform 35"/>
+            <p:cNvSpPr/>
+            <p:nvPr/>
+          </p:nvSpPr>
+          <p:spPr>
+            <a:xfrm>
+              <a:off x="1178542" y="709778"/>
+              <a:ext cx="77528" cy="29032"/>
+            </a:xfrm>
+            <a:custGeom>
+              <a:avLst/>
+              <a:gdLst>
+                <a:gd name="connsiteX0" fmla="*/ 0 w 50006"/>
+                <a:gd name="connsiteY0" fmla="*/ 0 h 19050"/>
+                <a:gd name="connsiteX1" fmla="*/ 0 w 50006"/>
+                <a:gd name="connsiteY1" fmla="*/ 0 h 19050"/>
+                <a:gd name="connsiteX2" fmla="*/ 21431 w 50006"/>
+                <a:gd name="connsiteY2" fmla="*/ 4762 h 19050"/>
+                <a:gd name="connsiteX3" fmla="*/ 28575 w 50006"/>
+                <a:gd name="connsiteY3" fmla="*/ 9525 h 19050"/>
+                <a:gd name="connsiteX4" fmla="*/ 38100 w 50006"/>
+                <a:gd name="connsiteY4" fmla="*/ 14287 h 19050"/>
+                <a:gd name="connsiteX5" fmla="*/ 50006 w 50006"/>
+                <a:gd name="connsiteY5" fmla="*/ 19050 h 19050"/>
+              </a:gdLst>
+              <a:ahLst/>
+              <a:cxnLst>
+                <a:cxn ang="0">
+                  <a:pos x="connsiteX0" y="connsiteY0"/>
+                </a:cxn>
+                <a:cxn ang="0">
+                  <a:pos x="connsiteX1" y="connsiteY1"/>
+                </a:cxn>
+                <a:cxn ang="0">
+                  <a:pos x="connsiteX2" y="connsiteY2"/>
+                </a:cxn>
+                <a:cxn ang="0">
+                  <a:pos x="connsiteX3" y="connsiteY3"/>
+                </a:cxn>
+                <a:cxn ang="0">
+                  <a:pos x="connsiteX4" y="connsiteY4"/>
+                </a:cxn>
+                <a:cxn ang="0">
+                  <a:pos x="connsiteX5" y="connsiteY5"/>
+                </a:cxn>
+              </a:cxnLst>
+              <a:rect l="l" t="t" r="r" b="b"/>
+              <a:pathLst>
+                <a:path w="50006" h="19050">
+                  <a:moveTo>
+                    <a:pt x="0" y="0"/>
+                  </a:moveTo>
+                  <a:lnTo>
+                    <a:pt x="0" y="0"/>
+                  </a:lnTo>
+                  <a:cubicBezTo>
+                    <a:pt x="7144" y="1587"/>
+                    <a:pt x="14489" y="2448"/>
+                    <a:pt x="21431" y="4762"/>
+                  </a:cubicBezTo>
+                  <a:cubicBezTo>
+                    <a:pt x="24146" y="5667"/>
+                    <a:pt x="26090" y="8105"/>
+                    <a:pt x="28575" y="9525"/>
+                  </a:cubicBezTo>
+                  <a:cubicBezTo>
+                    <a:pt x="31657" y="11286"/>
+                    <a:pt x="34837" y="12889"/>
+                    <a:pt x="38100" y="14287"/>
+                  </a:cubicBezTo>
+                  <a:cubicBezTo>
+                    <a:pt x="58672" y="23103"/>
+                    <a:pt x="34691" y="11391"/>
+                    <a:pt x="50006" y="19050"/>
+                  </a:cubicBezTo>
+                </a:path>
+              </a:pathLst>
+            </a:custGeom>
+            <a:noFill/>
+            <a:ln w="28575">
+              <a:solidFill>
+                <a:schemeClr val="tx2"/>
+              </a:solidFill>
+            </a:ln>
+          </p:spPr>
+          <p:style>
+            <a:lnRef idx="2">
+              <a:schemeClr val="accent1">
+                <a:shade val="50000"/>
+              </a:schemeClr>
+            </a:lnRef>
+            <a:fillRef idx="1">
+              <a:schemeClr val="accent1"/>
+            </a:fillRef>
+            <a:effectRef idx="0">
+              <a:schemeClr val="accent1"/>
+            </a:effectRef>
+            <a:fontRef idx="minor">
+              <a:schemeClr val="lt1"/>
+            </a:fontRef>
+          </p:style>
+          <p:txBody>
+            <a:bodyPr rtlCol="0" anchor="ctr"/>
+            <a:lstStyle/>
+            <a:p>
+              <a:pPr algn="ctr"/>
+              <a:endParaRPr lang="en-SG"/>
+            </a:p>
+          </p:txBody>
+        </p:sp>
+        <p:sp>
+          <p:nvSpPr>
+            <p:cNvPr id="2" name="Freeform 1"/>
+            <p:cNvSpPr/>
+            <p:nvPr/>
+          </p:nvSpPr>
+          <p:spPr>
+            <a:xfrm rot="20784184">
+              <a:off x="1054353" y="666002"/>
+              <a:ext cx="80391" cy="94854"/>
+            </a:xfrm>
+            <a:custGeom>
+              <a:avLst/>
+              <a:gdLst>
+                <a:gd name="connsiteX0" fmla="*/ 80391 w 80391"/>
+                <a:gd name="connsiteY0" fmla="*/ 94854 h 94854"/>
+                <a:gd name="connsiteX1" fmla="*/ 8302 w 80391"/>
+                <a:gd name="connsiteY1" fmla="*/ 60707 h 94854"/>
+                <a:gd name="connsiteX2" fmla="*/ 4507 w 80391"/>
+                <a:gd name="connsiteY2" fmla="*/ 0 h 94854"/>
+              </a:gdLst>
+              <a:ahLst/>
+              <a:cxnLst>
+                <a:cxn ang="0">
+                  <a:pos x="connsiteX0" y="connsiteY0"/>
+                </a:cxn>
+                <a:cxn ang="0">
+                  <a:pos x="connsiteX1" y="connsiteY1"/>
+                </a:cxn>
+                <a:cxn ang="0">
+                  <a:pos x="connsiteX2" y="connsiteY2"/>
+                </a:cxn>
+              </a:cxnLst>
+              <a:rect l="l" t="t" r="r" b="b"/>
+              <a:pathLst>
+                <a:path w="80391" h="94854">
+                  <a:moveTo>
+                    <a:pt x="80391" y="94854"/>
+                  </a:moveTo>
+                  <a:cubicBezTo>
+                    <a:pt x="50670" y="85685"/>
+                    <a:pt x="20949" y="76516"/>
+                    <a:pt x="8302" y="60707"/>
+                  </a:cubicBezTo>
+                  <a:cubicBezTo>
+                    <a:pt x="-4345" y="44898"/>
+                    <a:pt x="81" y="22449"/>
+                    <a:pt x="4507" y="0"/>
+                  </a:cubicBezTo>
+                </a:path>
+              </a:pathLst>
+            </a:custGeom>
+            <a:noFill/>
+            <a:ln w="28575" cap="rnd">
+              <a:solidFill>
+                <a:schemeClr val="tx2"/>
+              </a:solidFill>
+            </a:ln>
+          </p:spPr>
+          <p:style>
+            <a:lnRef idx="2">
+              <a:schemeClr val="accent1">
+                <a:shade val="50000"/>
+              </a:schemeClr>
+            </a:lnRef>
+            <a:fillRef idx="1">
+              <a:schemeClr val="accent1"/>
+            </a:fillRef>
+            <a:effectRef idx="0">
+              <a:schemeClr val="accent1"/>
+            </a:effectRef>
+            <a:fontRef idx="minor">
+              <a:schemeClr val="lt1"/>
+            </a:fontRef>
+          </p:style>
+          <p:txBody>
+            <a:bodyPr rtlCol="0" anchor="ctr"/>
+            <a:lstStyle/>
+            <a:p>
+              <a:pPr algn="ctr"/>
+              <a:endParaRPr lang="en-US"/>
+            </a:p>
+          </p:txBody>
+        </p:sp>
+        <p:sp>
+          <p:nvSpPr>
+            <p:cNvPr id="18" name="Flowchart: Connector 17"/>
+            <p:cNvSpPr/>
+            <p:nvPr/>
+          </p:nvSpPr>
+          <p:spPr>
+            <a:xfrm>
+              <a:off x="1044330" y="542440"/>
+              <a:ext cx="70882" cy="69675"/>
+            </a:xfrm>
+            <a:prstGeom prst="flowChartConnector">
+              <a:avLst/>
+            </a:prstGeom>
+            <a:noFill/>
+            <a:ln w="28575">
+              <a:solidFill>
+                <a:schemeClr val="tx2"/>
+              </a:solidFill>
+            </a:ln>
+          </p:spPr>
+          <p:style>
+            <a:lnRef idx="2">
+              <a:schemeClr val="accent1">
+                <a:shade val="50000"/>
+              </a:schemeClr>
+            </a:lnRef>
+            <a:fillRef idx="1">
+              <a:schemeClr val="accent1"/>
+            </a:fillRef>
+            <a:effectRef idx="0">
+              <a:schemeClr val="accent1"/>
+            </a:effectRef>
+            <a:fontRef idx="minor">
+              <a:schemeClr val="lt1"/>
+            </a:fontRef>
+          </p:style>
+          <p:txBody>
+            <a:bodyPr rtlCol="0" anchor="ctr"/>
+            <a:lstStyle/>
+            <a:p>
+              <a:pPr algn="ctr"/>
+              <a:endParaRPr lang="en-SG"/>
+            </a:p>
+          </p:txBody>
+        </p:sp>
+        <p:sp>
+          <p:nvSpPr>
+            <p:cNvPr id="4" name="Rounded Rectangle 3"/>
+            <p:cNvSpPr/>
+            <p:nvPr/>
+          </p:nvSpPr>
+          <p:spPr>
+            <a:xfrm>
+              <a:off x="1487043" y="660353"/>
+              <a:ext cx="353141" cy="394039"/>
+            </a:xfrm>
+            <a:prstGeom prst="roundRect">
+              <a:avLst>
+                <a:gd name="adj" fmla="val 0"/>
+              </a:avLst>
+            </a:prstGeom>
+            <a:noFill/>
+            <a:ln w="28575" cap="rnd">
+              <a:solidFill>
+                <a:schemeClr val="accent6">
+                  <a:lumMod val="75000"/>
+                </a:schemeClr>
+              </a:solidFill>
+            </a:ln>
+          </p:spPr>
+          <p:style>
+            <a:lnRef idx="2">
+              <a:schemeClr val="accent1">
+                <a:shade val="50000"/>
+              </a:schemeClr>
+            </a:lnRef>
+            <a:fillRef idx="1">
+              <a:schemeClr val="accent1"/>
+            </a:fillRef>
+            <a:effectRef idx="0">
+              <a:schemeClr val="accent1"/>
+            </a:effectRef>
+            <a:fontRef idx="minor">
+              <a:schemeClr val="lt1"/>
+            </a:fontRef>
+          </p:style>
+          <p:txBody>
+            <a:bodyPr rtlCol="0" anchor="ctr"/>
+            <a:lstStyle/>
+            <a:p>
+              <a:pPr algn="ctr"/>
+              <a:endParaRPr lang="en-US"/>
+            </a:p>
+          </p:txBody>
+        </p:sp>
+        <p:sp>
+          <p:nvSpPr>
+            <p:cNvPr id="20" name="Freeform 19"/>
+            <p:cNvSpPr/>
+            <p:nvPr/>
+          </p:nvSpPr>
+          <p:spPr>
+            <a:xfrm>
+              <a:off x="1178542" y="892005"/>
+              <a:ext cx="247795" cy="193503"/>
+            </a:xfrm>
+            <a:custGeom>
+              <a:avLst/>
+              <a:gdLst>
+                <a:gd name="connsiteX0" fmla="*/ 0 w 231445"/>
+                <a:gd name="connsiteY0" fmla="*/ 41736 h 193503"/>
+                <a:gd name="connsiteX1" fmla="*/ 125208 w 231445"/>
+                <a:gd name="connsiteY1" fmla="*/ 193503 h 193503"/>
+                <a:gd name="connsiteX2" fmla="*/ 231445 w 231445"/>
+                <a:gd name="connsiteY2" fmla="*/ 0 h 193503"/>
+              </a:gdLst>
+              <a:ahLst/>
+              <a:cxnLst>
+                <a:cxn ang="0">
+                  <a:pos x="connsiteX0" y="connsiteY0"/>
+                </a:cxn>
+                <a:cxn ang="0">
+                  <a:pos x="connsiteX1" y="connsiteY1"/>
+                </a:cxn>
+                <a:cxn ang="0">
+                  <a:pos x="connsiteX2" y="connsiteY2"/>
+                </a:cxn>
+              </a:cxnLst>
+              <a:rect l="l" t="t" r="r" b="b"/>
+              <a:pathLst>
+                <a:path w="231445" h="193503">
+                  <a:moveTo>
+                    <a:pt x="0" y="41736"/>
+                  </a:moveTo>
+                  <a:lnTo>
+                    <a:pt x="125208" y="193503"/>
+                  </a:lnTo>
+                  <a:lnTo>
+                    <a:pt x="231445" y="0"/>
+                  </a:lnTo>
+                </a:path>
+              </a:pathLst>
+            </a:custGeom>
+            <a:noFill/>
+            <a:ln w="28575" cap="rnd">
+              <a:solidFill>
+                <a:schemeClr val="tx2"/>
+              </a:solidFill>
+              <a:tailEnd type="oval"/>
+            </a:ln>
+          </p:spPr>
+          <p:style>
+            <a:lnRef idx="2">
+              <a:schemeClr val="accent1">
+                <a:shade val="50000"/>
+              </a:schemeClr>
+            </a:lnRef>
+            <a:fillRef idx="1">
+              <a:schemeClr val="accent1"/>
+            </a:fillRef>
+            <a:effectRef idx="0">
+              <a:schemeClr val="accent1"/>
+            </a:effectRef>
+            <a:fontRef idx="minor">
+              <a:schemeClr val="lt1"/>
+            </a:fontRef>
+          </p:style>
+          <p:txBody>
+            <a:bodyPr rtlCol="0" anchor="ctr"/>
+            <a:lstStyle/>
+            <a:p>
+              <a:pPr algn="ctr"/>
+              <a:endParaRPr lang="en-US">
+                <a:solidFill>
+                  <a:schemeClr val="lt1"/>
+                </a:solidFill>
+              </a:endParaRPr>
+            </a:p>
+          </p:txBody>
+        </p:sp>
+        <p:cxnSp>
+          <p:nvCxnSpPr>
+            <p:cNvPr id="5" name="Straight Connector 4"/>
+            <p:cNvCxnSpPr/>
+            <p:nvPr/>
+          </p:nvCxnSpPr>
+          <p:spPr>
+            <a:xfrm>
+              <a:off x="1536648" y="709778"/>
+              <a:ext cx="246622" cy="0"/>
+            </a:xfrm>
+            <a:prstGeom prst="line">
+              <a:avLst/>
+            </a:prstGeom>
+            <a:ln>
+              <a:solidFill>
+                <a:schemeClr val="accent6">
+                  <a:lumMod val="75000"/>
+                </a:schemeClr>
+              </a:solidFill>
+            </a:ln>
+          </p:spPr>
+          <p:style>
+            <a:lnRef idx="1">
+              <a:schemeClr val="accent1"/>
+            </a:lnRef>
+            <a:fillRef idx="0">
+              <a:schemeClr val="accent1"/>
+            </a:fillRef>
+            <a:effectRef idx="0">
+              <a:schemeClr val="accent1"/>
+            </a:effectRef>
+            <a:fontRef idx="minor">
+              <a:schemeClr val="tx1"/>
+            </a:fontRef>
+          </p:style>
+        </p:cxnSp>
+        <p:cxnSp>
+          <p:nvCxnSpPr>
+            <p:cNvPr id="14" name="Straight Connector 13"/>
+            <p:cNvCxnSpPr/>
+            <p:nvPr/>
+          </p:nvCxnSpPr>
+          <p:spPr>
+            <a:xfrm>
+              <a:off x="1536648" y="768891"/>
+              <a:ext cx="246622" cy="0"/>
+            </a:xfrm>
+            <a:prstGeom prst="line">
+              <a:avLst/>
+            </a:prstGeom>
+            <a:ln>
+              <a:solidFill>
+                <a:schemeClr val="accent6">
+                  <a:lumMod val="75000"/>
+                </a:schemeClr>
+              </a:solidFill>
+            </a:ln>
+          </p:spPr>
+          <p:style>
+            <a:lnRef idx="1">
+              <a:schemeClr val="accent1"/>
+            </a:lnRef>
+            <a:fillRef idx="0">
+              <a:schemeClr val="accent1"/>
+            </a:fillRef>
+            <a:effectRef idx="0">
+              <a:schemeClr val="accent1"/>
+            </a:effectRef>
+            <a:fontRef idx="minor">
+              <a:schemeClr val="tx1"/>
+            </a:fontRef>
+          </p:style>
+        </p:cxnSp>
+        <p:cxnSp>
+          <p:nvCxnSpPr>
+            <p:cNvPr id="15" name="Straight Connector 14"/>
+            <p:cNvCxnSpPr/>
+            <p:nvPr/>
+          </p:nvCxnSpPr>
+          <p:spPr>
+            <a:xfrm>
+              <a:off x="1536648" y="828004"/>
+              <a:ext cx="246622" cy="0"/>
+            </a:xfrm>
+            <a:prstGeom prst="line">
+              <a:avLst/>
+            </a:prstGeom>
+            <a:ln>
+              <a:solidFill>
+                <a:schemeClr val="accent6">
+                  <a:lumMod val="75000"/>
+                </a:schemeClr>
+              </a:solidFill>
+            </a:ln>
+          </p:spPr>
+          <p:style>
+            <a:lnRef idx="1">
+              <a:schemeClr val="accent1"/>
+            </a:lnRef>
+            <a:fillRef idx="0">
+              <a:schemeClr val="accent1"/>
+            </a:fillRef>
+            <a:effectRef idx="0">
+              <a:schemeClr val="accent1"/>
+            </a:effectRef>
+            <a:fontRef idx="minor">
+              <a:schemeClr val="tx1"/>
+            </a:fontRef>
+          </p:style>
+        </p:cxnSp>
+        <p:cxnSp>
+          <p:nvCxnSpPr>
+            <p:cNvPr id="16" name="Straight Connector 15"/>
+            <p:cNvCxnSpPr/>
+            <p:nvPr/>
+          </p:nvCxnSpPr>
+          <p:spPr>
+            <a:xfrm>
+              <a:off x="1536648" y="887117"/>
+              <a:ext cx="246622" cy="0"/>
+            </a:xfrm>
+            <a:prstGeom prst="line">
+              <a:avLst/>
+            </a:prstGeom>
+            <a:ln>
+              <a:solidFill>
+                <a:schemeClr val="accent6">
+                  <a:lumMod val="75000"/>
+                </a:schemeClr>
+              </a:solidFill>
+            </a:ln>
+          </p:spPr>
+          <p:style>
+            <a:lnRef idx="1">
+              <a:schemeClr val="accent1"/>
+            </a:lnRef>
+            <a:fillRef idx="0">
+              <a:schemeClr val="accent1"/>
+            </a:fillRef>
+            <a:effectRef idx="0">
+              <a:schemeClr val="accent1"/>
+            </a:effectRef>
+            <a:fontRef idx="minor">
+              <a:schemeClr val="tx1"/>
+            </a:fontRef>
+          </p:style>
+        </p:cxnSp>
+        <p:sp>
+          <p:nvSpPr>
+            <p:cNvPr id="6" name="Pentagon 5"/>
+            <p:cNvSpPr/>
+            <p:nvPr/>
+          </p:nvSpPr>
+          <p:spPr>
+            <a:xfrm rot="2240143">
+              <a:off x="1282872" y="869145"/>
+              <a:ext cx="326300" cy="45719"/>
+            </a:xfrm>
+            <a:prstGeom prst="homePlate">
+              <a:avLst/>
+            </a:prstGeom>
+            <a:solidFill>
+              <a:schemeClr val="tx2"/>
+            </a:solidFill>
+            <a:ln>
+              <a:noFill/>
+            </a:ln>
+          </p:spPr>
+          <p:style>
+            <a:lnRef idx="2">
+              <a:schemeClr val="accent1">
+                <a:shade val="50000"/>
+              </a:schemeClr>
+            </a:lnRef>
+            <a:fillRef idx="1">
+              <a:schemeClr val="accent1"/>
+            </a:fillRef>
+            <a:effectRef idx="0">
+              <a:schemeClr val="accent1"/>
+            </a:effectRef>
+            <a:fontRef idx="minor">
+              <a:schemeClr val="lt1"/>
+            </a:fontRef>
+          </p:style>
+          <p:txBody>
+            <a:bodyPr rtlCol="0" anchor="ctr"/>
+            <a:lstStyle/>
+            <a:p>
+              <a:pPr algn="ctr"/>
+              <a:endParaRPr lang="en-US"/>
+            </a:p>
+          </p:txBody>
+        </p:sp>
+        <p:sp>
+          <p:nvSpPr>
+            <p:cNvPr id="8" name="Freeform 7"/>
+            <p:cNvSpPr/>
+            <p:nvPr/>
+          </p:nvSpPr>
+          <p:spPr>
+            <a:xfrm>
+              <a:off x="1608737" y="937165"/>
+              <a:ext cx="106237" cy="75884"/>
+            </a:xfrm>
+            <a:custGeom>
+              <a:avLst/>
+              <a:gdLst>
+                <a:gd name="connsiteX0" fmla="*/ 0 w 106237"/>
+                <a:gd name="connsiteY0" fmla="*/ 26559 h 75884"/>
+                <a:gd name="connsiteX1" fmla="*/ 30353 w 106237"/>
+                <a:gd name="connsiteY1" fmla="*/ 75884 h 75884"/>
+                <a:gd name="connsiteX2" fmla="*/ 106237 w 106237"/>
+                <a:gd name="connsiteY2" fmla="*/ 0 h 75884"/>
+              </a:gdLst>
+              <a:ahLst/>
+              <a:cxnLst>
+                <a:cxn ang="0">
+                  <a:pos x="connsiteX0" y="connsiteY0"/>
+                </a:cxn>
+                <a:cxn ang="0">
+                  <a:pos x="connsiteX1" y="connsiteY1"/>
+                </a:cxn>
+                <a:cxn ang="0">
+                  <a:pos x="connsiteX2" y="connsiteY2"/>
+                </a:cxn>
+              </a:cxnLst>
+              <a:rect l="l" t="t" r="r" b="b"/>
+              <a:pathLst>
+                <a:path w="106237" h="75884">
+                  <a:moveTo>
+                    <a:pt x="0" y="26559"/>
+                  </a:moveTo>
+                  <a:lnTo>
+                    <a:pt x="30353" y="75884"/>
+                  </a:lnTo>
+                  <a:lnTo>
+                    <a:pt x="106237" y="0"/>
+                  </a:lnTo>
+                </a:path>
+              </a:pathLst>
+            </a:custGeom>
+            <a:noFill/>
+            <a:ln w="28575" cap="rnd">
+              <a:solidFill>
+                <a:srgbClr val="00B050"/>
+              </a:solidFill>
+            </a:ln>
+          </p:spPr>
+          <p:style>
+            <a:lnRef idx="2">
+              <a:schemeClr val="accent1">
+                <a:shade val="50000"/>
+              </a:schemeClr>
+            </a:lnRef>
+            <a:fillRef idx="1">
+              <a:schemeClr val="accent1"/>
+            </a:fillRef>
+            <a:effectRef idx="0">
+              <a:schemeClr val="accent1"/>
+            </a:effectRef>
+            <a:fontRef idx="minor">
+              <a:schemeClr val="lt1"/>
+            </a:fontRef>
+          </p:style>
+          <p:txBody>
+            <a:bodyPr rtlCol="0" anchor="ctr"/>
+            <a:lstStyle/>
+            <a:p>
+              <a:pPr algn="ctr"/>
+              <a:endParaRPr lang="en-US">
+                <a:solidFill>
+                  <a:schemeClr val="lt1"/>
+                </a:solidFill>
+              </a:endParaRPr>
+            </a:p>
+          </p:txBody>
+        </p:sp>
+      </p:grpSp>
+    </p:spTree>
+    <p:extLst>
+      <p:ext uri="{BB962C8B-B14F-4D97-AF65-F5344CB8AC3E}">
+        <p14:creationId xmlns:p14="http://schemas.microsoft.com/office/powerpoint/2010/main" val="1177397186"/>
+      </p:ext>
+    </p:extLst>
+  </p:cSld>
+  <p:clrMapOvr>
+    <a:masterClrMapping/>
+  </p:clrMapOvr>
+  <p:timing>
+    <p:tnLst>
+      <p:par>
+        <p:cTn id="1" dur="indefinite" restart="never" nodeType="tmRoot"/>
+      </p:par>
+    </p:tnLst>
+  </p:timing>
+</p:sld>
+</file>
+
+<file path=ppt/tags/tag1.xml><?xml version="1.0" encoding="utf-8"?>
+<p:tagLst xmlns:a="http://schemas.openxmlformats.org/drawingml/2006/main" xmlns:r="http://schemas.openxmlformats.org/officeDocument/2006/relationships" xmlns:p="http://schemas.openxmlformats.org/presentationml/2006/main">
+  <p:tag name="ARTICULATE_PROJECT_OPEN" val="0"/>
+</p:tagLst>
+</file>
+
 <file path=ppt/theme/theme1.xml><?xml version="1.0" encoding="utf-8"?>
 <a:theme xmlns:a="http://schemas.openxmlformats.org/drawingml/2006/main" name="Office Theme">
   <a:themeElements>

</xml_diff>